<commit_message>
finishing up update ppt, some image modifications
</commit_message>
<xml_diff>
--- a/all the important files.pptx
+++ b/all the important files.pptx
@@ -12,6 +12,10 @@
     <p:sldId id="260" r:id="rId6"/>
     <p:sldId id="261" r:id="rId7"/>
     <p:sldId id="262" r:id="rId8"/>
+    <p:sldId id="263" r:id="rId9"/>
+    <p:sldId id="264" r:id="rId10"/>
+    <p:sldId id="268" r:id="rId11"/>
+    <p:sldId id="267" r:id="rId12"/>
   </p:sldIdLst>
   <p:sldSz cx="12192000" cy="6858000"/>
   <p:notesSz cx="6858000" cy="9144000"/>
@@ -110,6 +114,11 @@
       </a:defRPr>
     </a:lvl9pPr>
   </p:defaultTextStyle>
+  <p:extLst>
+    <p:ext uri="{EFAFB233-063F-42B5-8137-9DF3F51BA10A}">
+      <p15:sldGuideLst xmlns:p15="http://schemas.microsoft.com/office/powerpoint/2012/main"/>
+    </p:ext>
+  </p:extLst>
 </p:presentation>
 </file>
 
@@ -155,10 +164,9 @@
           </a:lstStyle>
           <a:p>
             <a:r>
-              <a:rPr lang="en-US" smtClean="0"/>
+              <a:rPr lang="en-US"/>
               <a:t>Click to edit Master title style</a:t>
             </a:r>
-            <a:endParaRPr lang="en-US"/>
           </a:p>
         </p:txBody>
       </p:sp>
@@ -220,10 +228,9 @@
           </a:lstStyle>
           <a:p>
             <a:r>
-              <a:rPr lang="en-US" smtClean="0"/>
+              <a:rPr lang="en-US"/>
               <a:t>Click to edit Master subtitle style</a:t>
             </a:r>
-            <a:endParaRPr lang="en-US"/>
           </a:p>
         </p:txBody>
       </p:sp>
@@ -244,7 +251,7 @@
           <a:p>
             <a:fld id="{EB3E526A-7F3E-48B9-8885-A744FDB762D4}" type="datetimeFigureOut">
               <a:rPr lang="en-US" smtClean="0"/>
-              <a:t>7/19/2019</a:t>
+              <a:t>7/23/2019</a:t>
             </a:fld>
             <a:endParaRPr lang="en-US"/>
           </a:p>
@@ -338,10 +345,9 @@
           <a:lstStyle/>
           <a:p>
             <a:r>
-              <a:rPr lang="en-US" smtClean="0"/>
+              <a:rPr lang="en-US"/>
               <a:t>Click to edit Master title style</a:t>
             </a:r>
-            <a:endParaRPr lang="en-US"/>
           </a:p>
         </p:txBody>
       </p:sp>
@@ -362,38 +368,37 @@
           <a:p>
             <a:pPr lvl="0"/>
             <a:r>
-              <a:rPr lang="en-US" smtClean="0"/>
+              <a:rPr lang="en-US"/>
               <a:t>Edit Master text styles</a:t>
             </a:r>
           </a:p>
           <a:p>
             <a:pPr lvl="1"/>
             <a:r>
-              <a:rPr lang="en-US" smtClean="0"/>
+              <a:rPr lang="en-US"/>
               <a:t>Second level</a:t>
             </a:r>
           </a:p>
           <a:p>
             <a:pPr lvl="2"/>
             <a:r>
-              <a:rPr lang="en-US" smtClean="0"/>
+              <a:rPr lang="en-US"/>
               <a:t>Third level</a:t>
             </a:r>
           </a:p>
           <a:p>
             <a:pPr lvl="3"/>
             <a:r>
-              <a:rPr lang="en-US" smtClean="0"/>
+              <a:rPr lang="en-US"/>
               <a:t>Fourth level</a:t>
             </a:r>
           </a:p>
           <a:p>
             <a:pPr lvl="4"/>
             <a:r>
-              <a:rPr lang="en-US" smtClean="0"/>
+              <a:rPr lang="en-US"/>
               <a:t>Fifth level</a:t>
             </a:r>
-            <a:endParaRPr lang="en-US"/>
           </a:p>
         </p:txBody>
       </p:sp>
@@ -414,7 +419,7 @@
           <a:p>
             <a:fld id="{EB3E526A-7F3E-48B9-8885-A744FDB762D4}" type="datetimeFigureOut">
               <a:rPr lang="en-US" smtClean="0"/>
-              <a:t>7/19/2019</a:t>
+              <a:t>7/23/2019</a:t>
             </a:fld>
             <a:endParaRPr lang="en-US"/>
           </a:p>
@@ -513,10 +518,9 @@
           <a:lstStyle/>
           <a:p>
             <a:r>
-              <a:rPr lang="en-US" smtClean="0"/>
+              <a:rPr lang="en-US"/>
               <a:t>Click to edit Master title style</a:t>
             </a:r>
-            <a:endParaRPr lang="en-US"/>
           </a:p>
         </p:txBody>
       </p:sp>
@@ -542,38 +546,37 @@
           <a:p>
             <a:pPr lvl="0"/>
             <a:r>
-              <a:rPr lang="en-US" smtClean="0"/>
+              <a:rPr lang="en-US"/>
               <a:t>Edit Master text styles</a:t>
             </a:r>
           </a:p>
           <a:p>
             <a:pPr lvl="1"/>
             <a:r>
-              <a:rPr lang="en-US" smtClean="0"/>
+              <a:rPr lang="en-US"/>
               <a:t>Second level</a:t>
             </a:r>
           </a:p>
           <a:p>
             <a:pPr lvl="2"/>
             <a:r>
-              <a:rPr lang="en-US" smtClean="0"/>
+              <a:rPr lang="en-US"/>
               <a:t>Third level</a:t>
             </a:r>
           </a:p>
           <a:p>
             <a:pPr lvl="3"/>
             <a:r>
-              <a:rPr lang="en-US" smtClean="0"/>
+              <a:rPr lang="en-US"/>
               <a:t>Fourth level</a:t>
             </a:r>
           </a:p>
           <a:p>
             <a:pPr lvl="4"/>
             <a:r>
-              <a:rPr lang="en-US" smtClean="0"/>
+              <a:rPr lang="en-US"/>
               <a:t>Fifth level</a:t>
             </a:r>
-            <a:endParaRPr lang="en-US"/>
           </a:p>
         </p:txBody>
       </p:sp>
@@ -594,7 +597,7 @@
           <a:p>
             <a:fld id="{EB3E526A-7F3E-48B9-8885-A744FDB762D4}" type="datetimeFigureOut">
               <a:rPr lang="en-US" smtClean="0"/>
-              <a:t>7/19/2019</a:t>
+              <a:t>7/23/2019</a:t>
             </a:fld>
             <a:endParaRPr lang="en-US"/>
           </a:p>
@@ -688,10 +691,9 @@
           <a:lstStyle/>
           <a:p>
             <a:r>
-              <a:rPr lang="en-US" smtClean="0"/>
+              <a:rPr lang="en-US"/>
               <a:t>Click to edit Master title style</a:t>
             </a:r>
-            <a:endParaRPr lang="en-US"/>
           </a:p>
         </p:txBody>
       </p:sp>
@@ -712,38 +714,37 @@
           <a:p>
             <a:pPr lvl="0"/>
             <a:r>
-              <a:rPr lang="en-US" smtClean="0"/>
+              <a:rPr lang="en-US"/>
               <a:t>Edit Master text styles</a:t>
             </a:r>
           </a:p>
           <a:p>
             <a:pPr lvl="1"/>
             <a:r>
-              <a:rPr lang="en-US" smtClean="0"/>
+              <a:rPr lang="en-US"/>
               <a:t>Second level</a:t>
             </a:r>
           </a:p>
           <a:p>
             <a:pPr lvl="2"/>
             <a:r>
-              <a:rPr lang="en-US" smtClean="0"/>
+              <a:rPr lang="en-US"/>
               <a:t>Third level</a:t>
             </a:r>
           </a:p>
           <a:p>
             <a:pPr lvl="3"/>
             <a:r>
-              <a:rPr lang="en-US" smtClean="0"/>
+              <a:rPr lang="en-US"/>
               <a:t>Fourth level</a:t>
             </a:r>
           </a:p>
           <a:p>
             <a:pPr lvl="4"/>
             <a:r>
-              <a:rPr lang="en-US" smtClean="0"/>
+              <a:rPr lang="en-US"/>
               <a:t>Fifth level</a:t>
             </a:r>
-            <a:endParaRPr lang="en-US"/>
           </a:p>
         </p:txBody>
       </p:sp>
@@ -764,7 +765,7 @@
           <a:p>
             <a:fld id="{EB3E526A-7F3E-48B9-8885-A744FDB762D4}" type="datetimeFigureOut">
               <a:rPr lang="en-US" smtClean="0"/>
-              <a:t>7/19/2019</a:t>
+              <a:t>7/23/2019</a:t>
             </a:fld>
             <a:endParaRPr lang="en-US"/>
           </a:p>
@@ -867,10 +868,9 @@
           </a:lstStyle>
           <a:p>
             <a:r>
-              <a:rPr lang="en-US" smtClean="0"/>
+              <a:rPr lang="en-US"/>
               <a:t>Click to edit Master title style</a:t>
             </a:r>
-            <a:endParaRPr lang="en-US"/>
           </a:p>
         </p:txBody>
       </p:sp>
@@ -987,7 +987,7 @@
           <a:p>
             <a:pPr lvl="0"/>
             <a:r>
-              <a:rPr lang="en-US" smtClean="0"/>
+              <a:rPr lang="en-US"/>
               <a:t>Edit Master text styles</a:t>
             </a:r>
           </a:p>
@@ -1010,7 +1010,7 @@
           <a:p>
             <a:fld id="{EB3E526A-7F3E-48B9-8885-A744FDB762D4}" type="datetimeFigureOut">
               <a:rPr lang="en-US" smtClean="0"/>
-              <a:t>7/19/2019</a:t>
+              <a:t>7/23/2019</a:t>
             </a:fld>
             <a:endParaRPr lang="en-US"/>
           </a:p>
@@ -1104,10 +1104,9 @@
           <a:lstStyle/>
           <a:p>
             <a:r>
-              <a:rPr lang="en-US" smtClean="0"/>
+              <a:rPr lang="en-US"/>
               <a:t>Click to edit Master title style</a:t>
             </a:r>
-            <a:endParaRPr lang="en-US"/>
           </a:p>
         </p:txBody>
       </p:sp>
@@ -1133,38 +1132,37 @@
           <a:p>
             <a:pPr lvl="0"/>
             <a:r>
-              <a:rPr lang="en-US" smtClean="0"/>
+              <a:rPr lang="en-US"/>
               <a:t>Edit Master text styles</a:t>
             </a:r>
           </a:p>
           <a:p>
             <a:pPr lvl="1"/>
             <a:r>
-              <a:rPr lang="en-US" smtClean="0"/>
+              <a:rPr lang="en-US"/>
               <a:t>Second level</a:t>
             </a:r>
           </a:p>
           <a:p>
             <a:pPr lvl="2"/>
             <a:r>
-              <a:rPr lang="en-US" smtClean="0"/>
+              <a:rPr lang="en-US"/>
               <a:t>Third level</a:t>
             </a:r>
           </a:p>
           <a:p>
             <a:pPr lvl="3"/>
             <a:r>
-              <a:rPr lang="en-US" smtClean="0"/>
+              <a:rPr lang="en-US"/>
               <a:t>Fourth level</a:t>
             </a:r>
           </a:p>
           <a:p>
             <a:pPr lvl="4"/>
             <a:r>
-              <a:rPr lang="en-US" smtClean="0"/>
+              <a:rPr lang="en-US"/>
               <a:t>Fifth level</a:t>
             </a:r>
-            <a:endParaRPr lang="en-US"/>
           </a:p>
         </p:txBody>
       </p:sp>
@@ -1190,38 +1188,37 @@
           <a:p>
             <a:pPr lvl="0"/>
             <a:r>
-              <a:rPr lang="en-US" smtClean="0"/>
+              <a:rPr lang="en-US"/>
               <a:t>Edit Master text styles</a:t>
             </a:r>
           </a:p>
           <a:p>
             <a:pPr lvl="1"/>
             <a:r>
-              <a:rPr lang="en-US" smtClean="0"/>
+              <a:rPr lang="en-US"/>
               <a:t>Second level</a:t>
             </a:r>
           </a:p>
           <a:p>
             <a:pPr lvl="2"/>
             <a:r>
-              <a:rPr lang="en-US" smtClean="0"/>
+              <a:rPr lang="en-US"/>
               <a:t>Third level</a:t>
             </a:r>
           </a:p>
           <a:p>
             <a:pPr lvl="3"/>
             <a:r>
-              <a:rPr lang="en-US" smtClean="0"/>
+              <a:rPr lang="en-US"/>
               <a:t>Fourth level</a:t>
             </a:r>
           </a:p>
           <a:p>
             <a:pPr lvl="4"/>
             <a:r>
-              <a:rPr lang="en-US" smtClean="0"/>
+              <a:rPr lang="en-US"/>
               <a:t>Fifth level</a:t>
             </a:r>
-            <a:endParaRPr lang="en-US"/>
           </a:p>
         </p:txBody>
       </p:sp>
@@ -1242,7 +1239,7 @@
           <a:p>
             <a:fld id="{EB3E526A-7F3E-48B9-8885-A744FDB762D4}" type="datetimeFigureOut">
               <a:rPr lang="en-US" smtClean="0"/>
-              <a:t>7/19/2019</a:t>
+              <a:t>7/23/2019</a:t>
             </a:fld>
             <a:endParaRPr lang="en-US"/>
           </a:p>
@@ -1341,10 +1338,9 @@
           <a:lstStyle/>
           <a:p>
             <a:r>
-              <a:rPr lang="en-US" smtClean="0"/>
+              <a:rPr lang="en-US"/>
               <a:t>Click to edit Master title style</a:t>
             </a:r>
-            <a:endParaRPr lang="en-US"/>
           </a:p>
         </p:txBody>
       </p:sp>
@@ -1407,7 +1403,7 @@
           <a:p>
             <a:pPr lvl="0"/>
             <a:r>
-              <a:rPr lang="en-US" smtClean="0"/>
+              <a:rPr lang="en-US"/>
               <a:t>Edit Master text styles</a:t>
             </a:r>
           </a:p>
@@ -1435,38 +1431,37 @@
           <a:p>
             <a:pPr lvl="0"/>
             <a:r>
-              <a:rPr lang="en-US" smtClean="0"/>
+              <a:rPr lang="en-US"/>
               <a:t>Edit Master text styles</a:t>
             </a:r>
           </a:p>
           <a:p>
             <a:pPr lvl="1"/>
             <a:r>
-              <a:rPr lang="en-US" smtClean="0"/>
+              <a:rPr lang="en-US"/>
               <a:t>Second level</a:t>
             </a:r>
           </a:p>
           <a:p>
             <a:pPr lvl="2"/>
             <a:r>
-              <a:rPr lang="en-US" smtClean="0"/>
+              <a:rPr lang="en-US"/>
               <a:t>Third level</a:t>
             </a:r>
           </a:p>
           <a:p>
             <a:pPr lvl="3"/>
             <a:r>
-              <a:rPr lang="en-US" smtClean="0"/>
+              <a:rPr lang="en-US"/>
               <a:t>Fourth level</a:t>
             </a:r>
           </a:p>
           <a:p>
             <a:pPr lvl="4"/>
             <a:r>
-              <a:rPr lang="en-US" smtClean="0"/>
+              <a:rPr lang="en-US"/>
               <a:t>Fifth level</a:t>
             </a:r>
-            <a:endParaRPr lang="en-US"/>
           </a:p>
         </p:txBody>
       </p:sp>
@@ -1529,7 +1524,7 @@
           <a:p>
             <a:pPr lvl="0"/>
             <a:r>
-              <a:rPr lang="en-US" smtClean="0"/>
+              <a:rPr lang="en-US"/>
               <a:t>Edit Master text styles</a:t>
             </a:r>
           </a:p>
@@ -1557,38 +1552,37 @@
           <a:p>
             <a:pPr lvl="0"/>
             <a:r>
-              <a:rPr lang="en-US" smtClean="0"/>
+              <a:rPr lang="en-US"/>
               <a:t>Edit Master text styles</a:t>
             </a:r>
           </a:p>
           <a:p>
             <a:pPr lvl="1"/>
             <a:r>
-              <a:rPr lang="en-US" smtClean="0"/>
+              <a:rPr lang="en-US"/>
               <a:t>Second level</a:t>
             </a:r>
           </a:p>
           <a:p>
             <a:pPr lvl="2"/>
             <a:r>
-              <a:rPr lang="en-US" smtClean="0"/>
+              <a:rPr lang="en-US"/>
               <a:t>Third level</a:t>
             </a:r>
           </a:p>
           <a:p>
             <a:pPr lvl="3"/>
             <a:r>
-              <a:rPr lang="en-US" smtClean="0"/>
+              <a:rPr lang="en-US"/>
               <a:t>Fourth level</a:t>
             </a:r>
           </a:p>
           <a:p>
             <a:pPr lvl="4"/>
             <a:r>
-              <a:rPr lang="en-US" smtClean="0"/>
+              <a:rPr lang="en-US"/>
               <a:t>Fifth level</a:t>
             </a:r>
-            <a:endParaRPr lang="en-US"/>
           </a:p>
         </p:txBody>
       </p:sp>
@@ -1609,7 +1603,7 @@
           <a:p>
             <a:fld id="{EB3E526A-7F3E-48B9-8885-A744FDB762D4}" type="datetimeFigureOut">
               <a:rPr lang="en-US" smtClean="0"/>
-              <a:t>7/19/2019</a:t>
+              <a:t>7/23/2019</a:t>
             </a:fld>
             <a:endParaRPr lang="en-US"/>
           </a:p>
@@ -1703,10 +1697,9 @@
           <a:lstStyle/>
           <a:p>
             <a:r>
-              <a:rPr lang="en-US" smtClean="0"/>
+              <a:rPr lang="en-US"/>
               <a:t>Click to edit Master title style</a:t>
             </a:r>
-            <a:endParaRPr lang="en-US"/>
           </a:p>
         </p:txBody>
       </p:sp>
@@ -1727,7 +1720,7 @@
           <a:p>
             <a:fld id="{EB3E526A-7F3E-48B9-8885-A744FDB762D4}" type="datetimeFigureOut">
               <a:rPr lang="en-US" smtClean="0"/>
-              <a:t>7/19/2019</a:t>
+              <a:t>7/23/2019</a:t>
             </a:fld>
             <a:endParaRPr lang="en-US"/>
           </a:p>
@@ -1822,7 +1815,7 @@
           <a:p>
             <a:fld id="{EB3E526A-7F3E-48B9-8885-A744FDB762D4}" type="datetimeFigureOut">
               <a:rPr lang="en-US" smtClean="0"/>
-              <a:t>7/19/2019</a:t>
+              <a:t>7/23/2019</a:t>
             </a:fld>
             <a:endParaRPr lang="en-US"/>
           </a:p>
@@ -1925,10 +1918,9 @@
           </a:lstStyle>
           <a:p>
             <a:r>
-              <a:rPr lang="en-US" smtClean="0"/>
+              <a:rPr lang="en-US"/>
               <a:t>Click to edit Master title style</a:t>
             </a:r>
-            <a:endParaRPr lang="en-US"/>
           </a:p>
         </p:txBody>
       </p:sp>
@@ -1982,38 +1974,37 @@
           <a:p>
             <a:pPr lvl="0"/>
             <a:r>
-              <a:rPr lang="en-US" smtClean="0"/>
+              <a:rPr lang="en-US"/>
               <a:t>Edit Master text styles</a:t>
             </a:r>
           </a:p>
           <a:p>
             <a:pPr lvl="1"/>
             <a:r>
-              <a:rPr lang="en-US" smtClean="0"/>
+              <a:rPr lang="en-US"/>
               <a:t>Second level</a:t>
             </a:r>
           </a:p>
           <a:p>
             <a:pPr lvl="2"/>
             <a:r>
-              <a:rPr lang="en-US" smtClean="0"/>
+              <a:rPr lang="en-US"/>
               <a:t>Third level</a:t>
             </a:r>
           </a:p>
           <a:p>
             <a:pPr lvl="3"/>
             <a:r>
-              <a:rPr lang="en-US" smtClean="0"/>
+              <a:rPr lang="en-US"/>
               <a:t>Fourth level</a:t>
             </a:r>
           </a:p>
           <a:p>
             <a:pPr lvl="4"/>
             <a:r>
-              <a:rPr lang="en-US" smtClean="0"/>
+              <a:rPr lang="en-US"/>
               <a:t>Fifth level</a:t>
             </a:r>
-            <a:endParaRPr lang="en-US"/>
           </a:p>
         </p:txBody>
       </p:sp>
@@ -2076,7 +2067,7 @@
           <a:p>
             <a:pPr lvl="0"/>
             <a:r>
-              <a:rPr lang="en-US" smtClean="0"/>
+              <a:rPr lang="en-US"/>
               <a:t>Edit Master text styles</a:t>
             </a:r>
           </a:p>
@@ -2099,7 +2090,7 @@
           <a:p>
             <a:fld id="{EB3E526A-7F3E-48B9-8885-A744FDB762D4}" type="datetimeFigureOut">
               <a:rPr lang="en-US" smtClean="0"/>
-              <a:t>7/19/2019</a:t>
+              <a:t>7/23/2019</a:t>
             </a:fld>
             <a:endParaRPr lang="en-US"/>
           </a:p>
@@ -2202,10 +2193,9 @@
           </a:lstStyle>
           <a:p>
             <a:r>
-              <a:rPr lang="en-US" smtClean="0"/>
+              <a:rPr lang="en-US"/>
               <a:t>Click to edit Master title style</a:t>
             </a:r>
-            <a:endParaRPr lang="en-US"/>
           </a:p>
         </p:txBody>
       </p:sp>
@@ -2329,7 +2319,7 @@
           <a:p>
             <a:pPr lvl="0"/>
             <a:r>
-              <a:rPr lang="en-US" smtClean="0"/>
+              <a:rPr lang="en-US"/>
               <a:t>Edit Master text styles</a:t>
             </a:r>
           </a:p>
@@ -2352,7 +2342,7 @@
           <a:p>
             <a:fld id="{EB3E526A-7F3E-48B9-8885-A744FDB762D4}" type="datetimeFigureOut">
               <a:rPr lang="en-US" smtClean="0"/>
-              <a:t>7/19/2019</a:t>
+              <a:t>7/23/2019</a:t>
             </a:fld>
             <a:endParaRPr lang="en-US"/>
           </a:p>
@@ -2461,10 +2451,9 @@
           <a:lstStyle/>
           <a:p>
             <a:r>
-              <a:rPr lang="en-US" smtClean="0"/>
+              <a:rPr lang="en-US"/>
               <a:t>Click to edit Master title style</a:t>
             </a:r>
-            <a:endParaRPr lang="en-US"/>
           </a:p>
         </p:txBody>
       </p:sp>
@@ -2495,38 +2484,37 @@
           <a:p>
             <a:pPr lvl="0"/>
             <a:r>
-              <a:rPr lang="en-US" smtClean="0"/>
+              <a:rPr lang="en-US"/>
               <a:t>Edit Master text styles</a:t>
             </a:r>
           </a:p>
           <a:p>
             <a:pPr lvl="1"/>
             <a:r>
-              <a:rPr lang="en-US" smtClean="0"/>
+              <a:rPr lang="en-US"/>
               <a:t>Second level</a:t>
             </a:r>
           </a:p>
           <a:p>
             <a:pPr lvl="2"/>
             <a:r>
-              <a:rPr lang="en-US" smtClean="0"/>
+              <a:rPr lang="en-US"/>
               <a:t>Third level</a:t>
             </a:r>
           </a:p>
           <a:p>
             <a:pPr lvl="3"/>
             <a:r>
-              <a:rPr lang="en-US" smtClean="0"/>
+              <a:rPr lang="en-US"/>
               <a:t>Fourth level</a:t>
             </a:r>
           </a:p>
           <a:p>
             <a:pPr lvl="4"/>
             <a:r>
-              <a:rPr lang="en-US" smtClean="0"/>
+              <a:rPr lang="en-US"/>
               <a:t>Fifth level</a:t>
             </a:r>
-            <a:endParaRPr lang="en-US"/>
           </a:p>
         </p:txBody>
       </p:sp>
@@ -2565,7 +2553,7 @@
           <a:p>
             <a:fld id="{EB3E526A-7F3E-48B9-8885-A744FDB762D4}" type="datetimeFigureOut">
               <a:rPr lang="en-US" smtClean="0"/>
-              <a:t>7/19/2019</a:t>
+              <a:t>7/23/2019</a:t>
             </a:fld>
             <a:endParaRPr lang="en-US"/>
           </a:p>
@@ -2985,7 +2973,10 @@
           <a:bodyPr/>
           <a:lstStyle/>
           <a:p>
-            <a:endParaRPr lang="en-US"/>
+            <a:r>
+              <a:rPr lang="en-US" dirty="0"/>
+              <a:t>Genes and Clusters - Cataract</a:t>
+            </a:r>
           </a:p>
         </p:txBody>
       </p:sp>
@@ -3004,7 +2995,10 @@
           <a:bodyPr/>
           <a:lstStyle/>
           <a:p>
-            <a:endParaRPr lang="en-US"/>
+            <a:r>
+              <a:rPr lang="en-US" dirty="0"/>
+              <a:t>Derrick Yao</a:t>
+            </a:r>
           </a:p>
         </p:txBody>
       </p:sp>
@@ -3012,6 +3006,268 @@
     <p:extLst>
       <p:ext uri="{BB962C8B-B14F-4D97-AF65-F5344CB8AC3E}">
         <p14:creationId xmlns:p14="http://schemas.microsoft.com/office/powerpoint/2010/main" val="3837371587"/>
+      </p:ext>
+    </p:extLst>
+  </p:cSld>
+  <p:clrMapOvr>
+    <a:masterClrMapping/>
+  </p:clrMapOvr>
+</p:sld>
+</file>
+
+<file path=ppt/slides/slide10.xml><?xml version="1.0" encoding="utf-8"?>
+<p:sld xmlns:a="http://schemas.openxmlformats.org/drawingml/2006/main" xmlns:r="http://schemas.openxmlformats.org/officeDocument/2006/relationships" xmlns:p="http://schemas.openxmlformats.org/presentationml/2006/main">
+  <p:cSld>
+    <p:spTree>
+      <p:nvGrpSpPr>
+        <p:cNvPr id="1" name=""/>
+        <p:cNvGrpSpPr/>
+        <p:nvPr/>
+      </p:nvGrpSpPr>
+      <p:grpSpPr>
+        <a:xfrm>
+          <a:off x="0" y="0"/>
+          <a:ext cx="0" cy="0"/>
+          <a:chOff x="0" y="0"/>
+          <a:chExt cx="0" cy="0"/>
+        </a:xfrm>
+      </p:grpSpPr>
+      <p:sp>
+        <p:nvSpPr>
+          <p:cNvPr id="2" name="Title 1">
+            <a:extLst>
+              <a:ext uri="{FF2B5EF4-FFF2-40B4-BE49-F238E27FC236}">
+                <a16:creationId xmlns:a16="http://schemas.microsoft.com/office/drawing/2014/main" id="{F1E7232D-33CC-42C4-BDF5-995C2CF98E1E}"/>
+              </a:ext>
+            </a:extLst>
+          </p:cNvPr>
+          <p:cNvSpPr>
+            <a:spLocks noGrp="1"/>
+          </p:cNvSpPr>
+          <p:nvPr>
+            <p:ph type="title"/>
+          </p:nvPr>
+        </p:nvSpPr>
+        <p:spPr/>
+        <p:txBody>
+          <a:bodyPr>
+            <a:normAutofit/>
+          </a:bodyPr>
+          <a:lstStyle/>
+          <a:p>
+            <a:r>
+              <a:rPr lang="en-US" dirty="0"/>
+              <a:t>Ingenuity results</a:t>
+            </a:r>
+            <a:br>
+              <a:rPr lang="en-US" dirty="0"/>
+            </a:br>
+            <a:r>
+              <a:rPr lang="en-US" sz="2800" dirty="0"/>
+              <a:t>Cluster 20: Sucrose Degradation V</a:t>
+            </a:r>
+            <a:endParaRPr lang="en-US" dirty="0"/>
+          </a:p>
+        </p:txBody>
+      </p:sp>
+      <p:sp>
+        <p:nvSpPr>
+          <p:cNvPr id="3" name="Text Placeholder 2">
+            <a:extLst>
+              <a:ext uri="{FF2B5EF4-FFF2-40B4-BE49-F238E27FC236}">
+                <a16:creationId xmlns:a16="http://schemas.microsoft.com/office/drawing/2014/main" id="{5EEF6ED2-761C-400C-BC02-80334B8AA558}"/>
+              </a:ext>
+            </a:extLst>
+          </p:cNvPr>
+          <p:cNvSpPr>
+            <a:spLocks noGrp="1"/>
+          </p:cNvSpPr>
+          <p:nvPr>
+            <p:ph type="body" idx="1"/>
+          </p:nvPr>
+        </p:nvSpPr>
+        <p:spPr/>
+        <p:txBody>
+          <a:bodyPr/>
+          <a:lstStyle/>
+          <a:p>
+            <a:r>
+              <a:rPr lang="en-US" dirty="0"/>
+              <a:t>Network 1: Carbohydrate Metabolism</a:t>
+            </a:r>
+          </a:p>
+        </p:txBody>
+      </p:sp>
+      <p:pic>
+        <p:nvPicPr>
+          <p:cNvPr id="7" name="Content Placeholder 6">
+            <a:extLst>
+              <a:ext uri="{FF2B5EF4-FFF2-40B4-BE49-F238E27FC236}">
+                <a16:creationId xmlns:a16="http://schemas.microsoft.com/office/drawing/2014/main" id="{E8C80A62-0C21-4A47-A913-E3DD772563F2}"/>
+              </a:ext>
+            </a:extLst>
+          </p:cNvPr>
+          <p:cNvPicPr>
+            <a:picLocks noGrp="1" noChangeAspect="1"/>
+          </p:cNvPicPr>
+          <p:nvPr>
+            <p:ph sz="half" idx="2"/>
+          </p:nvPr>
+        </p:nvPicPr>
+        <p:blipFill>
+          <a:blip r:embed="rId2">
+            <a:extLst>
+              <a:ext uri="{28A0092B-C50C-407E-A947-70E740481C1C}">
+                <a14:useLocalDpi xmlns:a14="http://schemas.microsoft.com/office/drawing/2010/main" val="0"/>
+              </a:ext>
+            </a:extLst>
+          </a:blip>
+          <a:stretch>
+            <a:fillRect/>
+          </a:stretch>
+        </p:blipFill>
+        <p:spPr>
+          <a:xfrm>
+            <a:off x="1741670" y="2505075"/>
+            <a:ext cx="3354023" cy="3684588"/>
+          </a:xfrm>
+        </p:spPr>
+      </p:pic>
+    </p:spTree>
+    <p:extLst>
+      <p:ext uri="{BB962C8B-B14F-4D97-AF65-F5344CB8AC3E}">
+        <p14:creationId xmlns:p14="http://schemas.microsoft.com/office/powerpoint/2010/main" val="2982688808"/>
+      </p:ext>
+    </p:extLst>
+  </p:cSld>
+  <p:clrMapOvr>
+    <a:masterClrMapping/>
+  </p:clrMapOvr>
+</p:sld>
+</file>
+
+<file path=ppt/slides/slide11.xml><?xml version="1.0" encoding="utf-8"?>
+<p:sld xmlns:a="http://schemas.openxmlformats.org/drawingml/2006/main" xmlns:r="http://schemas.openxmlformats.org/officeDocument/2006/relationships" xmlns:p="http://schemas.openxmlformats.org/presentationml/2006/main">
+  <p:cSld>
+    <p:spTree>
+      <p:nvGrpSpPr>
+        <p:cNvPr id="1" name=""/>
+        <p:cNvGrpSpPr/>
+        <p:nvPr/>
+      </p:nvGrpSpPr>
+      <p:grpSpPr>
+        <a:xfrm>
+          <a:off x="0" y="0"/>
+          <a:ext cx="0" cy="0"/>
+          <a:chOff x="0" y="0"/>
+          <a:chExt cx="0" cy="0"/>
+        </a:xfrm>
+      </p:grpSpPr>
+      <p:sp>
+        <p:nvSpPr>
+          <p:cNvPr id="2" name="Title 1">
+            <a:extLst>
+              <a:ext uri="{FF2B5EF4-FFF2-40B4-BE49-F238E27FC236}">
+                <a16:creationId xmlns:a16="http://schemas.microsoft.com/office/drawing/2014/main" id="{F1E7232D-33CC-42C4-BDF5-995C2CF98E1E}"/>
+              </a:ext>
+            </a:extLst>
+          </p:cNvPr>
+          <p:cNvSpPr>
+            <a:spLocks noGrp="1"/>
+          </p:cNvSpPr>
+          <p:nvPr>
+            <p:ph type="title"/>
+          </p:nvPr>
+        </p:nvSpPr>
+        <p:spPr/>
+        <p:txBody>
+          <a:bodyPr>
+            <a:normAutofit/>
+          </a:bodyPr>
+          <a:lstStyle/>
+          <a:p>
+            <a:r>
+              <a:rPr lang="en-US" dirty="0"/>
+              <a:t>Ingenuity results</a:t>
+            </a:r>
+            <a:br>
+              <a:rPr lang="en-US" dirty="0"/>
+            </a:br>
+            <a:r>
+              <a:rPr lang="en-US" sz="2800" dirty="0"/>
+              <a:t>Cluster 21: Role of IL-17A in Psoriasis</a:t>
+            </a:r>
+            <a:endParaRPr lang="en-US" dirty="0"/>
+          </a:p>
+        </p:txBody>
+      </p:sp>
+      <p:sp>
+        <p:nvSpPr>
+          <p:cNvPr id="3" name="Text Placeholder 2">
+            <a:extLst>
+              <a:ext uri="{FF2B5EF4-FFF2-40B4-BE49-F238E27FC236}">
+                <a16:creationId xmlns:a16="http://schemas.microsoft.com/office/drawing/2014/main" id="{5EEF6ED2-761C-400C-BC02-80334B8AA558}"/>
+              </a:ext>
+            </a:extLst>
+          </p:cNvPr>
+          <p:cNvSpPr>
+            <a:spLocks noGrp="1"/>
+          </p:cNvSpPr>
+          <p:nvPr>
+            <p:ph type="body" idx="1"/>
+          </p:nvPr>
+        </p:nvSpPr>
+        <p:spPr/>
+        <p:txBody>
+          <a:bodyPr/>
+          <a:lstStyle/>
+          <a:p>
+            <a:r>
+              <a:rPr lang="en-US" dirty="0"/>
+              <a:t>Network 1: Cell Death and Survival</a:t>
+            </a:r>
+          </a:p>
+        </p:txBody>
+      </p:sp>
+      <p:pic>
+        <p:nvPicPr>
+          <p:cNvPr id="12" name="Content Placeholder 11">
+            <a:extLst>
+              <a:ext uri="{FF2B5EF4-FFF2-40B4-BE49-F238E27FC236}">
+                <a16:creationId xmlns:a16="http://schemas.microsoft.com/office/drawing/2014/main" id="{79449645-ECD2-455E-BEF4-64CEDE787B87}"/>
+              </a:ext>
+            </a:extLst>
+          </p:cNvPr>
+          <p:cNvPicPr>
+            <a:picLocks noGrp="1" noChangeAspect="1"/>
+          </p:cNvPicPr>
+          <p:nvPr>
+            <p:ph sz="half" idx="2"/>
+          </p:nvPr>
+        </p:nvPicPr>
+        <p:blipFill>
+          <a:blip r:embed="rId2">
+            <a:extLst>
+              <a:ext uri="{28A0092B-C50C-407E-A947-70E740481C1C}">
+                <a14:useLocalDpi xmlns:a14="http://schemas.microsoft.com/office/drawing/2010/main" val="0"/>
+              </a:ext>
+            </a:extLst>
+          </a:blip>
+          <a:stretch>
+            <a:fillRect/>
+          </a:stretch>
+        </p:blipFill>
+        <p:spPr>
+          <a:xfrm>
+            <a:off x="1351399" y="2505075"/>
+            <a:ext cx="4134564" cy="3684588"/>
+          </a:xfrm>
+        </p:spPr>
+      </p:pic>
+    </p:spTree>
+    <p:extLst>
+      <p:ext uri="{BB962C8B-B14F-4D97-AF65-F5344CB8AC3E}">
+        <p14:creationId xmlns:p14="http://schemas.microsoft.com/office/powerpoint/2010/main" val="2143859576"/>
       </p:ext>
     </p:extLst>
   </p:cSld>
@@ -3059,18 +3315,13 @@
           <a:lstStyle/>
           <a:p>
             <a:r>
-              <a:rPr lang="en-US" dirty="0" err="1" smtClean="0"/>
+              <a:rPr lang="en-US" dirty="0" err="1"/>
               <a:t>Phenopedia</a:t>
             </a:r>
             <a:r>
               <a:rPr lang="en-US" dirty="0"/>
-              <a:t> </a:t>
-            </a:r>
-            <a:r>
-              <a:rPr lang="en-US" dirty="0" smtClean="0"/>
-              <a:t>Gene Network</a:t>
-            </a:r>
-            <a:endParaRPr lang="en-US" dirty="0"/>
+              <a:t> Gene Network</a:t>
+            </a:r>
           </a:p>
         </p:txBody>
       </p:sp>
@@ -3151,14 +3402,13 @@
           <a:lstStyle/>
           <a:p>
             <a:r>
-              <a:rPr lang="en-US" dirty="0" err="1" smtClean="0"/>
+              <a:rPr lang="en-US" dirty="0" err="1"/>
               <a:t>Phenopedia</a:t>
             </a:r>
             <a:r>
-              <a:rPr lang="en-US" dirty="0" smtClean="0"/>
+              <a:rPr lang="en-US" dirty="0"/>
               <a:t> – only input genes</a:t>
             </a:r>
-            <a:endParaRPr lang="en-US" dirty="0"/>
           </a:p>
         </p:txBody>
       </p:sp>
@@ -3280,10 +3530,9 @@
           <a:lstStyle/>
           <a:p>
             <a:r>
-              <a:rPr lang="en-US" dirty="0" smtClean="0"/>
+              <a:rPr lang="en-US" dirty="0"/>
               <a:t>PubMed Gene Network</a:t>
             </a:r>
-            <a:endParaRPr lang="en-US" dirty="0"/>
           </a:p>
         </p:txBody>
       </p:sp>
@@ -3333,10 +3582,9 @@
           <a:lstStyle/>
           <a:p>
             <a:r>
-              <a:rPr lang="en-US" dirty="0" smtClean="0"/>
+              <a:rPr lang="en-US" dirty="0"/>
               <a:t>PubMed – only input genes</a:t>
             </a:r>
-            <a:endParaRPr lang="en-US" dirty="0"/>
           </a:p>
         </p:txBody>
       </p:sp>
@@ -3458,22 +3706,21 @@
           <a:lstStyle/>
           <a:p>
             <a:r>
-              <a:rPr lang="en-US" dirty="0" err="1" smtClean="0"/>
+              <a:rPr lang="en-US" dirty="0" err="1"/>
               <a:t>Phenopedia</a:t>
             </a:r>
             <a:r>
-              <a:rPr lang="en-US" dirty="0" smtClean="0"/>
+              <a:rPr lang="en-US" dirty="0"/>
               <a:t> – </a:t>
             </a:r>
             <a:r>
-              <a:rPr lang="en-US" dirty="0" err="1" smtClean="0"/>
+              <a:rPr lang="en-US" dirty="0" err="1"/>
               <a:t>ClusterONE</a:t>
             </a:r>
             <a:r>
-              <a:rPr lang="en-US" dirty="0" smtClean="0"/>
+              <a:rPr lang="en-US" dirty="0"/>
               <a:t> clustering</a:t>
             </a:r>
-            <a:endParaRPr lang="en-US" dirty="0"/>
           </a:p>
         </p:txBody>
       </p:sp>
@@ -3668,10 +3915,9 @@
               <a:buNone/>
             </a:pPr>
             <a:r>
-              <a:rPr lang="en-US" dirty="0" smtClean="0"/>
+              <a:rPr lang="en-US" dirty="0"/>
               <a:t>for p&lt;0.25</a:t>
             </a:r>
-            <a:endParaRPr lang="en-US" dirty="0"/>
           </a:p>
         </p:txBody>
       </p:sp>
@@ -3725,10 +3971,9 @@
               <a:buNone/>
             </a:pPr>
             <a:r>
-              <a:rPr lang="en-US" dirty="0" smtClean="0"/>
+              <a:rPr lang="en-US" dirty="0"/>
               <a:t>for p&lt;0.05</a:t>
             </a:r>
-            <a:endParaRPr lang="en-US" dirty="0"/>
           </a:p>
         </p:txBody>
       </p:sp>
@@ -3972,6 +4217,111 @@
           </a:prstGeom>
         </p:spPr>
       </p:pic>
+      <p:sp>
+        <p:nvSpPr>
+          <p:cNvPr id="11" name="TextBox 10">
+            <a:extLst>
+              <a:ext uri="{FF2B5EF4-FFF2-40B4-BE49-F238E27FC236}">
+                <a16:creationId xmlns:a16="http://schemas.microsoft.com/office/drawing/2014/main" id="{FFD04C52-DFD6-45E4-B427-38630E44AF1B}"/>
+              </a:ext>
+            </a:extLst>
+          </p:cNvPr>
+          <p:cNvSpPr txBox="1"/>
+          <p:nvPr/>
+        </p:nvSpPr>
+        <p:spPr>
+          <a:xfrm>
+            <a:off x="2325511" y="2009422"/>
+            <a:ext cx="460674" cy="369332"/>
+          </a:xfrm>
+          <a:prstGeom prst="rect">
+            <a:avLst/>
+          </a:prstGeom>
+          <a:noFill/>
+        </p:spPr>
+        <p:txBody>
+          <a:bodyPr wrap="square" rtlCol="0">
+            <a:spAutoFit/>
+          </a:bodyPr>
+          <a:lstStyle/>
+          <a:p>
+            <a:r>
+              <a:rPr lang="en-US" dirty="0"/>
+              <a:t>7</a:t>
+            </a:r>
+          </a:p>
+        </p:txBody>
+      </p:sp>
+      <p:sp>
+        <p:nvSpPr>
+          <p:cNvPr id="19" name="TextBox 18">
+            <a:extLst>
+              <a:ext uri="{FF2B5EF4-FFF2-40B4-BE49-F238E27FC236}">
+                <a16:creationId xmlns:a16="http://schemas.microsoft.com/office/drawing/2014/main" id="{9BE2D204-7D39-4D94-93DB-BAD4FE58C256}"/>
+              </a:ext>
+            </a:extLst>
+          </p:cNvPr>
+          <p:cNvSpPr txBox="1"/>
+          <p:nvPr/>
+        </p:nvSpPr>
+        <p:spPr>
+          <a:xfrm>
+            <a:off x="5220579" y="1863969"/>
+            <a:ext cx="418704" cy="369332"/>
+          </a:xfrm>
+          <a:prstGeom prst="rect">
+            <a:avLst/>
+          </a:prstGeom>
+          <a:noFill/>
+        </p:spPr>
+        <p:txBody>
+          <a:bodyPr wrap="none" rtlCol="0">
+            <a:spAutoFit/>
+          </a:bodyPr>
+          <a:lstStyle/>
+          <a:p>
+            <a:r>
+              <a:rPr lang="en-US" dirty="0"/>
+              <a:t>20</a:t>
+            </a:r>
+          </a:p>
+        </p:txBody>
+      </p:sp>
+      <p:sp>
+        <p:nvSpPr>
+          <p:cNvPr id="20" name="TextBox 19">
+            <a:extLst>
+              <a:ext uri="{FF2B5EF4-FFF2-40B4-BE49-F238E27FC236}">
+                <a16:creationId xmlns:a16="http://schemas.microsoft.com/office/drawing/2014/main" id="{CE0A1D22-524C-4AD9-A0EA-961C5C37F703}"/>
+              </a:ext>
+            </a:extLst>
+          </p:cNvPr>
+          <p:cNvSpPr txBox="1"/>
+          <p:nvPr/>
+        </p:nvSpPr>
+        <p:spPr>
+          <a:xfrm>
+            <a:off x="8096157" y="1882801"/>
+            <a:ext cx="418704" cy="369332"/>
+          </a:xfrm>
+          <a:prstGeom prst="rect">
+            <a:avLst/>
+          </a:prstGeom>
+          <a:noFill/>
+        </p:spPr>
+        <p:txBody>
+          <a:bodyPr wrap="none" rtlCol="0">
+            <a:spAutoFit/>
+          </a:bodyPr>
+          <a:lstStyle/>
+          <a:p>
+            <a:r>
+              <a:rPr lang="en-US" dirty="0"/>
+              <a:t>21</a:t>
+            </a:r>
+          </a:p>
+        </p:txBody>
+      </p:sp>
     </p:spTree>
     <p:extLst>
       <p:ext uri="{BB962C8B-B14F-4D97-AF65-F5344CB8AC3E}">
@@ -4018,18 +4368,17 @@
           <a:lstStyle/>
           <a:p>
             <a:r>
-              <a:rPr lang="en-US" dirty="0" smtClean="0"/>
+              <a:rPr lang="en-US" dirty="0"/>
               <a:t>PubMed – </a:t>
             </a:r>
             <a:r>
-              <a:rPr lang="en-US" dirty="0" err="1" smtClean="0"/>
+              <a:rPr lang="en-US" dirty="0" err="1"/>
               <a:t>ClusterONE</a:t>
             </a:r>
             <a:r>
-              <a:rPr lang="en-US" dirty="0" smtClean="0"/>
+              <a:rPr lang="en-US" dirty="0"/>
               <a:t> clustering</a:t>
             </a:r>
-            <a:endParaRPr lang="en-US" dirty="0"/>
           </a:p>
         </p:txBody>
       </p:sp>
@@ -4059,10 +4408,9 @@
               <a:buNone/>
             </a:pPr>
             <a:r>
-              <a:rPr lang="en-US" dirty="0" smtClean="0"/>
+              <a:rPr lang="en-US" dirty="0"/>
               <a:t>for p&lt;0.05</a:t>
             </a:r>
-            <a:endParaRPr lang="en-US" dirty="0"/>
           </a:p>
         </p:txBody>
       </p:sp>
@@ -4257,10 +4605,9 @@
               <a:buNone/>
             </a:pPr>
             <a:r>
-              <a:rPr lang="en-US" dirty="0" smtClean="0"/>
+              <a:rPr lang="en-US" dirty="0"/>
               <a:t>for p&lt;0.25</a:t>
             </a:r>
-            <a:endParaRPr lang="en-US" dirty="0"/>
           </a:p>
         </p:txBody>
       </p:sp>
@@ -4504,10 +4851,433 @@
           </a:prstGeom>
         </p:spPr>
       </p:pic>
+      <p:sp>
+        <p:nvSpPr>
+          <p:cNvPr id="15" name="TextBox 14">
+            <a:extLst>
+              <a:ext uri="{FF2B5EF4-FFF2-40B4-BE49-F238E27FC236}">
+                <a16:creationId xmlns:a16="http://schemas.microsoft.com/office/drawing/2014/main" id="{25475F9B-9666-4429-9306-EDF24D885C3D}"/>
+              </a:ext>
+            </a:extLst>
+          </p:cNvPr>
+          <p:cNvSpPr txBox="1"/>
+          <p:nvPr/>
+        </p:nvSpPr>
+        <p:spPr>
+          <a:xfrm>
+            <a:off x="3273778" y="1886741"/>
+            <a:ext cx="180622" cy="369332"/>
+          </a:xfrm>
+          <a:prstGeom prst="rect">
+            <a:avLst/>
+          </a:prstGeom>
+          <a:noFill/>
+        </p:spPr>
+        <p:txBody>
+          <a:bodyPr wrap="square" rtlCol="0">
+            <a:spAutoFit/>
+          </a:bodyPr>
+          <a:lstStyle/>
+          <a:p>
+            <a:r>
+              <a:rPr lang="en-US" dirty="0"/>
+              <a:t>8</a:t>
+            </a:r>
+          </a:p>
+        </p:txBody>
+      </p:sp>
     </p:spTree>
     <p:extLst>
       <p:ext uri="{BB962C8B-B14F-4D97-AF65-F5344CB8AC3E}">
         <p14:creationId xmlns:p14="http://schemas.microsoft.com/office/powerpoint/2010/main" val="2930611261"/>
+      </p:ext>
+    </p:extLst>
+  </p:cSld>
+  <p:clrMapOvr>
+    <a:masterClrMapping/>
+  </p:clrMapOvr>
+</p:sld>
+</file>
+
+<file path=ppt/slides/slide8.xml><?xml version="1.0" encoding="utf-8"?>
+<p:sld xmlns:a="http://schemas.openxmlformats.org/drawingml/2006/main" xmlns:r="http://schemas.openxmlformats.org/officeDocument/2006/relationships" xmlns:p="http://schemas.openxmlformats.org/presentationml/2006/main">
+  <p:cSld>
+    <p:spTree>
+      <p:nvGrpSpPr>
+        <p:cNvPr id="1" name=""/>
+        <p:cNvGrpSpPr/>
+        <p:nvPr/>
+      </p:nvGrpSpPr>
+      <p:grpSpPr>
+        <a:xfrm>
+          <a:off x="0" y="0"/>
+          <a:ext cx="0" cy="0"/>
+          <a:chOff x="0" y="0"/>
+          <a:chExt cx="0" cy="0"/>
+        </a:xfrm>
+      </p:grpSpPr>
+      <p:sp>
+        <p:nvSpPr>
+          <p:cNvPr id="2" name="Title 1">
+            <a:extLst>
+              <a:ext uri="{FF2B5EF4-FFF2-40B4-BE49-F238E27FC236}">
+                <a16:creationId xmlns:a16="http://schemas.microsoft.com/office/drawing/2014/main" id="{F1E7232D-33CC-42C4-BDF5-995C2CF98E1E}"/>
+              </a:ext>
+            </a:extLst>
+          </p:cNvPr>
+          <p:cNvSpPr>
+            <a:spLocks noGrp="1"/>
+          </p:cNvSpPr>
+          <p:nvPr>
+            <p:ph type="title"/>
+          </p:nvPr>
+        </p:nvSpPr>
+        <p:spPr/>
+        <p:txBody>
+          <a:bodyPr>
+            <a:normAutofit/>
+          </a:bodyPr>
+          <a:lstStyle/>
+          <a:p>
+            <a:r>
+              <a:rPr lang="en-US" dirty="0"/>
+              <a:t>Ingenuity results</a:t>
+            </a:r>
+            <a:br>
+              <a:rPr lang="en-US" dirty="0"/>
+            </a:br>
+            <a:r>
+              <a:rPr lang="en-US" sz="2800" dirty="0"/>
+              <a:t>Cluster 7: Glucocorticoid Receptor Signaling</a:t>
+            </a:r>
+            <a:endParaRPr lang="en-US" dirty="0"/>
+          </a:p>
+        </p:txBody>
+      </p:sp>
+      <p:sp>
+        <p:nvSpPr>
+          <p:cNvPr id="3" name="Text Placeholder 2">
+            <a:extLst>
+              <a:ext uri="{FF2B5EF4-FFF2-40B4-BE49-F238E27FC236}">
+                <a16:creationId xmlns:a16="http://schemas.microsoft.com/office/drawing/2014/main" id="{5EEF6ED2-761C-400C-BC02-80334B8AA558}"/>
+              </a:ext>
+            </a:extLst>
+          </p:cNvPr>
+          <p:cNvSpPr>
+            <a:spLocks noGrp="1"/>
+          </p:cNvSpPr>
+          <p:nvPr>
+            <p:ph type="body" idx="1"/>
+          </p:nvPr>
+        </p:nvSpPr>
+        <p:spPr/>
+        <p:txBody>
+          <a:bodyPr/>
+          <a:lstStyle/>
+          <a:p>
+            <a:r>
+              <a:rPr lang="en-US" dirty="0"/>
+              <a:t>Network 1: Developmental Disorder</a:t>
+            </a:r>
+          </a:p>
+        </p:txBody>
+      </p:sp>
+      <p:sp>
+        <p:nvSpPr>
+          <p:cNvPr id="5" name="Text Placeholder 4">
+            <a:extLst>
+              <a:ext uri="{FF2B5EF4-FFF2-40B4-BE49-F238E27FC236}">
+                <a16:creationId xmlns:a16="http://schemas.microsoft.com/office/drawing/2014/main" id="{B00A8111-BA3C-4036-8C6B-EB9BCCC09E41}"/>
+              </a:ext>
+            </a:extLst>
+          </p:cNvPr>
+          <p:cNvSpPr>
+            <a:spLocks noGrp="1"/>
+          </p:cNvSpPr>
+          <p:nvPr>
+            <p:ph type="body" sz="quarter" idx="3"/>
+          </p:nvPr>
+        </p:nvSpPr>
+        <p:spPr/>
+        <p:txBody>
+          <a:bodyPr/>
+          <a:lstStyle/>
+          <a:p>
+            <a:r>
+              <a:rPr lang="en-US" dirty="0"/>
+              <a:t>Network 2: Cell Morphology</a:t>
+            </a:r>
+          </a:p>
+        </p:txBody>
+      </p:sp>
+      <p:pic>
+        <p:nvPicPr>
+          <p:cNvPr id="17" name="Content Placeholder 16">
+            <a:extLst>
+              <a:ext uri="{FF2B5EF4-FFF2-40B4-BE49-F238E27FC236}">
+                <a16:creationId xmlns:a16="http://schemas.microsoft.com/office/drawing/2014/main" id="{28D56989-ECB7-42D4-980B-2CA78E841DB7}"/>
+              </a:ext>
+            </a:extLst>
+          </p:cNvPr>
+          <p:cNvPicPr>
+            <a:picLocks noGrp="1" noChangeAspect="1"/>
+          </p:cNvPicPr>
+          <p:nvPr>
+            <p:ph sz="quarter" idx="4"/>
+          </p:nvPr>
+        </p:nvPicPr>
+        <p:blipFill>
+          <a:blip r:embed="rId2">
+            <a:extLst>
+              <a:ext uri="{28A0092B-C50C-407E-A947-70E740481C1C}">
+                <a14:useLocalDpi xmlns:a14="http://schemas.microsoft.com/office/drawing/2010/main" val="0"/>
+              </a:ext>
+            </a:extLst>
+          </a:blip>
+          <a:stretch>
+            <a:fillRect/>
+          </a:stretch>
+        </p:blipFill>
+        <p:spPr>
+          <a:xfrm>
+            <a:off x="7038595" y="2505075"/>
+            <a:ext cx="3450398" cy="3684588"/>
+          </a:xfrm>
+        </p:spPr>
+      </p:pic>
+      <p:pic>
+        <p:nvPicPr>
+          <p:cNvPr id="15" name="Content Placeholder 14">
+            <a:extLst>
+              <a:ext uri="{FF2B5EF4-FFF2-40B4-BE49-F238E27FC236}">
+                <a16:creationId xmlns:a16="http://schemas.microsoft.com/office/drawing/2014/main" id="{F3D468E7-A6F5-4ED8-9E8F-C00F4F5B8677}"/>
+              </a:ext>
+            </a:extLst>
+          </p:cNvPr>
+          <p:cNvPicPr>
+            <a:picLocks noGrp="1" noChangeAspect="1"/>
+          </p:cNvPicPr>
+          <p:nvPr>
+            <p:ph sz="half" idx="2"/>
+          </p:nvPr>
+        </p:nvPicPr>
+        <p:blipFill>
+          <a:blip r:embed="rId3">
+            <a:extLst>
+              <a:ext uri="{28A0092B-C50C-407E-A947-70E740481C1C}">
+                <a14:useLocalDpi xmlns:a14="http://schemas.microsoft.com/office/drawing/2010/main" val="0"/>
+              </a:ext>
+            </a:extLst>
+          </a:blip>
+          <a:stretch>
+            <a:fillRect/>
+          </a:stretch>
+        </p:blipFill>
+        <p:spPr>
+          <a:xfrm>
+            <a:off x="1227195" y="2505075"/>
+            <a:ext cx="4382973" cy="3684588"/>
+          </a:xfrm>
+        </p:spPr>
+      </p:pic>
+    </p:spTree>
+    <p:extLst>
+      <p:ext uri="{BB962C8B-B14F-4D97-AF65-F5344CB8AC3E}">
+        <p14:creationId xmlns:p14="http://schemas.microsoft.com/office/powerpoint/2010/main" val="2280519907"/>
+      </p:ext>
+    </p:extLst>
+  </p:cSld>
+  <p:clrMapOvr>
+    <a:masterClrMapping/>
+  </p:clrMapOvr>
+</p:sld>
+</file>
+
+<file path=ppt/slides/slide9.xml><?xml version="1.0" encoding="utf-8"?>
+<p:sld xmlns:a="http://schemas.openxmlformats.org/drawingml/2006/main" xmlns:r="http://schemas.openxmlformats.org/officeDocument/2006/relationships" xmlns:p="http://schemas.openxmlformats.org/presentationml/2006/main">
+  <p:cSld>
+    <p:spTree>
+      <p:nvGrpSpPr>
+        <p:cNvPr id="1" name=""/>
+        <p:cNvGrpSpPr/>
+        <p:nvPr/>
+      </p:nvGrpSpPr>
+      <p:grpSpPr>
+        <a:xfrm>
+          <a:off x="0" y="0"/>
+          <a:ext cx="0" cy="0"/>
+          <a:chOff x="0" y="0"/>
+          <a:chExt cx="0" cy="0"/>
+        </a:xfrm>
+      </p:grpSpPr>
+      <p:sp>
+        <p:nvSpPr>
+          <p:cNvPr id="2" name="Title 1">
+            <a:extLst>
+              <a:ext uri="{FF2B5EF4-FFF2-40B4-BE49-F238E27FC236}">
+                <a16:creationId xmlns:a16="http://schemas.microsoft.com/office/drawing/2014/main" id="{F1E7232D-33CC-42C4-BDF5-995C2CF98E1E}"/>
+              </a:ext>
+            </a:extLst>
+          </p:cNvPr>
+          <p:cNvSpPr>
+            <a:spLocks noGrp="1"/>
+          </p:cNvSpPr>
+          <p:nvPr>
+            <p:ph type="title"/>
+          </p:nvPr>
+        </p:nvSpPr>
+        <p:spPr/>
+        <p:txBody>
+          <a:bodyPr>
+            <a:normAutofit/>
+          </a:bodyPr>
+          <a:lstStyle/>
+          <a:p>
+            <a:r>
+              <a:rPr lang="en-US" dirty="0"/>
+              <a:t>Ingenuity results</a:t>
+            </a:r>
+            <a:br>
+              <a:rPr lang="en-US" dirty="0"/>
+            </a:br>
+            <a:r>
+              <a:rPr lang="en-US" sz="2800" dirty="0"/>
+              <a:t>Cluster 8: Glucocorticoid Receptor Signaling</a:t>
+            </a:r>
+            <a:endParaRPr lang="en-US" dirty="0"/>
+          </a:p>
+        </p:txBody>
+      </p:sp>
+      <p:sp>
+        <p:nvSpPr>
+          <p:cNvPr id="3" name="Text Placeholder 2">
+            <a:extLst>
+              <a:ext uri="{FF2B5EF4-FFF2-40B4-BE49-F238E27FC236}">
+                <a16:creationId xmlns:a16="http://schemas.microsoft.com/office/drawing/2014/main" id="{5EEF6ED2-761C-400C-BC02-80334B8AA558}"/>
+              </a:ext>
+            </a:extLst>
+          </p:cNvPr>
+          <p:cNvSpPr>
+            <a:spLocks noGrp="1"/>
+          </p:cNvSpPr>
+          <p:nvPr>
+            <p:ph type="body" idx="1"/>
+          </p:nvPr>
+        </p:nvSpPr>
+        <p:spPr/>
+        <p:txBody>
+          <a:bodyPr/>
+          <a:lstStyle/>
+          <a:p>
+            <a:r>
+              <a:rPr lang="en-US" dirty="0"/>
+              <a:t>Network 1: Developmental Disorder</a:t>
+            </a:r>
+          </a:p>
+        </p:txBody>
+      </p:sp>
+      <p:sp>
+        <p:nvSpPr>
+          <p:cNvPr id="5" name="Text Placeholder 4">
+            <a:extLst>
+              <a:ext uri="{FF2B5EF4-FFF2-40B4-BE49-F238E27FC236}">
+                <a16:creationId xmlns:a16="http://schemas.microsoft.com/office/drawing/2014/main" id="{B00A8111-BA3C-4036-8C6B-EB9BCCC09E41}"/>
+              </a:ext>
+            </a:extLst>
+          </p:cNvPr>
+          <p:cNvSpPr>
+            <a:spLocks noGrp="1"/>
+          </p:cNvSpPr>
+          <p:nvPr>
+            <p:ph type="body" sz="quarter" idx="3"/>
+          </p:nvPr>
+        </p:nvSpPr>
+        <p:spPr/>
+        <p:txBody>
+          <a:bodyPr/>
+          <a:lstStyle/>
+          <a:p>
+            <a:r>
+              <a:rPr lang="en-US" dirty="0"/>
+              <a:t>Network 2: Cellular Movement</a:t>
+            </a:r>
+          </a:p>
+        </p:txBody>
+      </p:sp>
+      <p:pic>
+        <p:nvPicPr>
+          <p:cNvPr id="18" name="Content Placeholder 17">
+            <a:extLst>
+              <a:ext uri="{FF2B5EF4-FFF2-40B4-BE49-F238E27FC236}">
+                <a16:creationId xmlns:a16="http://schemas.microsoft.com/office/drawing/2014/main" id="{D4280CA0-F4FB-4C66-AED2-4FDE4C4B24F1}"/>
+              </a:ext>
+            </a:extLst>
+          </p:cNvPr>
+          <p:cNvPicPr>
+            <a:picLocks noGrp="1" noChangeAspect="1"/>
+          </p:cNvPicPr>
+          <p:nvPr>
+            <p:ph sz="quarter" idx="4"/>
+          </p:nvPr>
+        </p:nvPicPr>
+        <p:blipFill>
+          <a:blip r:embed="rId2">
+            <a:extLst>
+              <a:ext uri="{28A0092B-C50C-407E-A947-70E740481C1C}">
+                <a14:useLocalDpi xmlns:a14="http://schemas.microsoft.com/office/drawing/2010/main" val="0"/>
+              </a:ext>
+            </a:extLst>
+          </a:blip>
+          <a:stretch>
+            <a:fillRect/>
+          </a:stretch>
+        </p:blipFill>
+        <p:spPr>
+          <a:xfrm>
+            <a:off x="6584294" y="2505075"/>
+            <a:ext cx="4358999" cy="3684588"/>
+          </a:xfrm>
+        </p:spPr>
+      </p:pic>
+      <p:pic>
+        <p:nvPicPr>
+          <p:cNvPr id="22" name="Content Placeholder 21">
+            <a:extLst>
+              <a:ext uri="{FF2B5EF4-FFF2-40B4-BE49-F238E27FC236}">
+                <a16:creationId xmlns:a16="http://schemas.microsoft.com/office/drawing/2014/main" id="{D2B5A457-72A6-4690-B7D5-7501C6BE75EF}"/>
+              </a:ext>
+            </a:extLst>
+          </p:cNvPr>
+          <p:cNvPicPr>
+            <a:picLocks noGrp="1" noChangeAspect="1"/>
+          </p:cNvPicPr>
+          <p:nvPr>
+            <p:ph sz="half" idx="2"/>
+          </p:nvPr>
+        </p:nvPicPr>
+        <p:blipFill>
+          <a:blip r:embed="rId3">
+            <a:extLst>
+              <a:ext uri="{28A0092B-C50C-407E-A947-70E740481C1C}">
+                <a14:useLocalDpi xmlns:a14="http://schemas.microsoft.com/office/drawing/2010/main" val="0"/>
+              </a:ext>
+            </a:extLst>
+          </a:blip>
+          <a:stretch>
+            <a:fillRect/>
+          </a:stretch>
+        </p:blipFill>
+        <p:spPr>
+          <a:xfrm>
+            <a:off x="839788" y="2591054"/>
+            <a:ext cx="5157787" cy="3512630"/>
+          </a:xfrm>
+        </p:spPr>
+      </p:pic>
+    </p:spTree>
+    <p:extLst>
+      <p:ext uri="{BB962C8B-B14F-4D97-AF65-F5344CB8AC3E}">
+        <p14:creationId xmlns:p14="http://schemas.microsoft.com/office/powerpoint/2010/main" val="1356145008"/>
       </p:ext>
     </p:extLst>
   </p:cSld>

</xml_diff>